<commit_message>
Fixed layout of logo
</commit_message>
<xml_diff>
--- a/images/logo-ieng-331.pptx
+++ b/images/logo-ieng-331.pptx
@@ -106,7 +106,18 @@
   </p:defaultTextStyle>
   <p:extLst>
     <p:ext uri="{EFAFB233-063F-42B5-8137-9DF3F51BA10A}">
-      <p15:sldGuideLst xmlns:p15="http://schemas.microsoft.com/office/powerpoint/2012/main"/>
+      <p15:sldGuideLst xmlns:p15="http://schemas.microsoft.com/office/powerpoint/2012/main">
+        <p15:guide id="1" orient="horz" pos="2304" userDrawn="1">
+          <p15:clr>
+            <a:srgbClr val="A4A3A4"/>
+          </p15:clr>
+        </p15:guide>
+        <p15:guide id="2" pos="2304" userDrawn="1">
+          <p15:clr>
+            <a:srgbClr val="A4A3A4"/>
+          </p15:clr>
+        </p15:guide>
+      </p15:sldGuideLst>
     </p:ext>
   </p:extLst>
 </p:presentation>
@@ -3022,8 +3033,8 @@
         </p:nvSpPr>
         <p:spPr>
           <a:xfrm>
-            <a:off x="0" y="5629072"/>
-            <a:ext cx="7315200" cy="1446550"/>
+            <a:off x="161365" y="5494587"/>
+            <a:ext cx="7153835" cy="1446550"/>
           </a:xfrm>
           <a:prstGeom prst="rect">
             <a:avLst/>

</xml_diff>